<commit_message>
loss analysis for GRW2017.
</commit_message>
<xml_diff>
--- a/GRW2017/grw2017_poster.pptx
+++ b/GRW2017/grw2017_poster.pptx
@@ -1582,7 +1582,19 @@
             </a:r>
             <a:r>
               <a:rPr lang="en-US" sz="3600" dirty="0" smtClean="0"/>
-              <a:t>the motor drive is integrated directly to the motor back-end and the system is modularized by dividing into several parts.</a:t>
+              <a:t>the motor drive is integrated directly to the motor back-end and the system is modularized by dividing into several </a:t>
+            </a:r>
+            <a:r>
+              <a:rPr lang="en-US" sz="3600" dirty="0" smtClean="0"/>
+              <a:t>parts</a:t>
+            </a:r>
+            <a:r>
+              <a:rPr lang="tr-TR" sz="3600" dirty="0" smtClean="0"/>
+              <a:t> [1]</a:t>
+            </a:r>
+            <a:r>
+              <a:rPr lang="en-US" sz="3600" dirty="0" smtClean="0"/>
+              <a:t>.</a:t>
             </a:r>
             <a:endParaRPr lang="en-US" sz="3600" dirty="0">
               <a:latin typeface="+mj-lt"/>
@@ -2155,8 +2167,21 @@
             </a:r>
             <a:r>
               <a:rPr lang="en-US" sz="3500" dirty="0" smtClean="0"/>
-              <a:t>of the overall system is enhanced significantly.</a:t>
-            </a:r>
+              <a:t>of the overall system is enhanced </a:t>
+            </a:r>
+            <a:r>
+              <a:rPr lang="en-US" sz="3500" dirty="0" smtClean="0"/>
+              <a:t>significantly</a:t>
+            </a:r>
+            <a:r>
+              <a:rPr lang="tr-TR" sz="3500" dirty="0" smtClean="0"/>
+              <a:t> [2]</a:t>
+            </a:r>
+            <a:r>
+              <a:rPr lang="en-US" sz="3500" dirty="0" smtClean="0"/>
+              <a:t>.</a:t>
+            </a:r>
+            <a:endParaRPr lang="en-US" sz="3500" dirty="0" smtClean="0"/>
           </a:p>
           <a:p>
             <a:pPr marL="571500" indent="-571500" algn="l">
@@ -2236,8 +2261,17 @@
             </a:pPr>
             <a:r>
               <a:rPr lang="en-US" sz="3500" dirty="0" smtClean="0"/>
-              <a:t>Power and control electronics components are subjected to high temperature and vibration</a:t>
-            </a:r>
+              <a:t>Power and control electronics components are subjected to high temperature and </a:t>
+            </a:r>
+            <a:r>
+              <a:rPr lang="en-US" sz="3500" dirty="0" smtClean="0"/>
+              <a:t>vibration</a:t>
+            </a:r>
+            <a:r>
+              <a:rPr lang="tr-TR" sz="3500" dirty="0" smtClean="0"/>
+              <a:t> [3].</a:t>
+            </a:r>
+            <a:endParaRPr lang="en-US" sz="3500" dirty="0" smtClean="0"/>
           </a:p>
         </p:txBody>
       </p:sp>
@@ -2303,7 +2337,7 @@
         </p:nvSpPr>
         <p:spPr bwMode="auto">
           <a:xfrm>
-            <a:off x="16111537" y="25228952"/>
+            <a:off x="16140691" y="24847382"/>
             <a:ext cx="13115925" cy="1015663"/>
           </a:xfrm>
           <a:prstGeom prst="rect">
@@ -2355,8 +2389,8 @@
         </p:nvSpPr>
         <p:spPr bwMode="auto">
           <a:xfrm>
-            <a:off x="16184516" y="37851350"/>
-            <a:ext cx="13115925" cy="3785652"/>
+            <a:off x="30805953" y="29788394"/>
+            <a:ext cx="13115925" cy="2862322"/>
           </a:xfrm>
           <a:prstGeom prst="rect">
             <a:avLst/>
@@ -2548,76 +2582,6 @@
               <a:t>.</a:t>
             </a:r>
             <a:endParaRPr lang="tr-TR" sz="2000" dirty="0" smtClean="0"/>
-          </a:p>
-          <a:p>
-            <a:pPr marL="514350" indent="-514350" algn="l" defTabSz="4389438">
-              <a:spcBef>
-                <a:spcPts val="0"/>
-              </a:spcBef>
-              <a:buFont typeface="+mj-lt"/>
-              <a:buAutoNum type="arabicPeriod"/>
-            </a:pPr>
-            <a:r>
-              <a:rPr lang="en-US" sz="2000" dirty="0" smtClean="0"/>
-              <a:t>M</a:t>
-            </a:r>
-            <a:r>
-              <a:rPr lang="en-US" sz="2000" dirty="0"/>
-              <a:t>. D. </a:t>
-            </a:r>
-            <a:r>
-              <a:rPr lang="en-US" sz="2000" dirty="0" err="1"/>
-              <a:t>Hennen</a:t>
-            </a:r>
-            <a:r>
-              <a:rPr lang="en-US" sz="2000" dirty="0"/>
-              <a:t>, M. </a:t>
-            </a:r>
-            <a:r>
-              <a:rPr lang="en-US" sz="2000" dirty="0" err="1"/>
-              <a:t>Niessen</a:t>
-            </a:r>
-            <a:r>
-              <a:rPr lang="en-US" sz="2000" dirty="0"/>
-              <a:t>, C. </a:t>
-            </a:r>
-            <a:r>
-              <a:rPr lang="en-US" sz="2000" dirty="0" err="1"/>
-              <a:t>Heyers</a:t>
-            </a:r>
-            <a:r>
-              <a:rPr lang="en-US" sz="2000" dirty="0"/>
-              <a:t>, H. J. </a:t>
-            </a:r>
-            <a:r>
-              <a:rPr lang="en-US" sz="2000" dirty="0" err="1"/>
-              <a:t>Brauer</a:t>
-            </a:r>
-            <a:r>
-              <a:rPr lang="en-US" sz="2000" dirty="0"/>
-              <a:t>, and R. W. De </a:t>
-            </a:r>
-            <a:r>
-              <a:rPr lang="en-US" sz="2000" dirty="0" err="1"/>
-              <a:t>Doncker</a:t>
-            </a:r>
-            <a:r>
-              <a:rPr lang="en-US" sz="2000" dirty="0"/>
-              <a:t>, “Development and control of an integrated and distributed inverter for a fault tolerant five-phase switched reluctance traction drive,” </a:t>
-            </a:r>
-            <a:r>
-              <a:rPr lang="en-US" sz="2000" i="1" dirty="0"/>
-              <a:t>IEEE Trans. Power Electron.</a:t>
-            </a:r>
-            <a:r>
-              <a:rPr lang="en-US" sz="2000" dirty="0"/>
-              <a:t>, vol. 27, no. 2, pp. 547–554, 2012.</a:t>
-            </a:r>
-            <a:endParaRPr lang="tr-TR" sz="2000" b="1" dirty="0" smtClean="0">
-              <a:solidFill>
-                <a:srgbClr val="003399"/>
-              </a:solidFill>
-            </a:endParaRPr>
           </a:p>
         </p:txBody>
       </p:sp>
@@ -2666,8 +2630,8 @@
         </p:blipFill>
         <p:spPr>
           <a:xfrm>
-            <a:off x="21366734" y="9767975"/>
-            <a:ext cx="8095013" cy="3244406"/>
+            <a:off x="21818200" y="9868298"/>
+            <a:ext cx="7843530" cy="3143614"/>
           </a:xfrm>
           <a:prstGeom prst="rect">
             <a:avLst/>
@@ -2713,7 +2677,7 @@
         </p:blipFill>
         <p:spPr>
           <a:xfrm>
-            <a:off x="23072731" y="13276185"/>
+            <a:off x="16047678" y="13581360"/>
             <a:ext cx="6358639" cy="6139449"/>
           </a:xfrm>
           <a:prstGeom prst="rect">
@@ -2737,7 +2701,7 @@
         </p:blipFill>
         <p:spPr>
           <a:xfrm>
-            <a:off x="22220353" y="20350545"/>
+            <a:off x="22045411" y="19555812"/>
             <a:ext cx="7944740" cy="5690114"/>
           </a:xfrm>
           <a:prstGeom prst="rect">
@@ -2761,7 +2725,7 @@
         </p:blipFill>
         <p:spPr>
           <a:xfrm>
-            <a:off x="15766624" y="18910303"/>
+            <a:off x="22406317" y="13718101"/>
             <a:ext cx="7365022" cy="5450961"/>
           </a:xfrm>
           <a:prstGeom prst="rect">
@@ -2819,7 +2783,7 @@
       </p:pic>
       <p:pic>
         <p:nvPicPr>
-          <p:cNvPr id="30" name="Picture 29"/>
+          <p:cNvPr id="33" name="Picture 32"/>
           <p:cNvPicPr>
             <a:picLocks noChangeAspect="1"/>
           </p:cNvPicPr>
@@ -2833,30 +2797,6 @@
         </p:blipFill>
         <p:spPr>
           <a:xfrm>
-            <a:off x="23142506" y="29483272"/>
-            <a:ext cx="6223101" cy="2543663"/>
-          </a:xfrm>
-          <a:prstGeom prst="rect">
-            <a:avLst/>
-          </a:prstGeom>
-        </p:spPr>
-      </p:pic>
-      <p:pic>
-        <p:nvPicPr>
-          <p:cNvPr id="33" name="Picture 32"/>
-          <p:cNvPicPr>
-            <a:picLocks noChangeAspect="1"/>
-          </p:cNvPicPr>
-          <p:nvPr/>
-        </p:nvPicPr>
-        <p:blipFill>
-          <a:blip r:embed="rId15"/>
-          <a:stretch>
-            <a:fillRect/>
-          </a:stretch>
-        </p:blipFill>
-        <p:spPr>
-          <a:xfrm>
             <a:off x="7950433" y="14624712"/>
             <a:ext cx="6194191" cy="4938469"/>
           </a:xfrm>
@@ -2913,8 +2853,17 @@
             </a:r>
             <a:r>
               <a:rPr lang="en-US" sz="3500" dirty="0" smtClean="0"/>
-              <a:t>is increased</a:t>
-            </a:r>
+              <a:t>is </a:t>
+            </a:r>
+            <a:r>
+              <a:rPr lang="en-US" sz="3500" dirty="0" smtClean="0"/>
+              <a:t>increased</a:t>
+            </a:r>
+            <a:r>
+              <a:rPr lang="tr-TR" sz="3500" dirty="0" smtClean="0"/>
+              <a:t>.</a:t>
+            </a:r>
+            <a:endParaRPr lang="en-US" sz="3500" dirty="0" smtClean="0"/>
           </a:p>
           <a:p>
             <a:pPr marL="571500" indent="-571500" algn="l">
@@ -2927,8 +2876,17 @@
             </a:r>
             <a:r>
               <a:rPr lang="en-US" sz="3500" dirty="0" smtClean="0"/>
-              <a:t>on modules is reduced</a:t>
-            </a:r>
+              <a:t>on modules is </a:t>
+            </a:r>
+            <a:r>
+              <a:rPr lang="en-US" sz="3500" dirty="0" smtClean="0"/>
+              <a:t>reduced</a:t>
+            </a:r>
+            <a:r>
+              <a:rPr lang="tr-TR" sz="3500" dirty="0" smtClean="0"/>
+              <a:t>.</a:t>
+            </a:r>
+            <a:endParaRPr lang="en-US" sz="3500" dirty="0" smtClean="0"/>
           </a:p>
           <a:p>
             <a:pPr marL="571500" indent="-571500" algn="l">
@@ -2941,8 +2899,17 @@
             </a:r>
             <a:r>
               <a:rPr lang="en-US" sz="3500" dirty="0" smtClean="0"/>
-              <a:t>is distributed to a wider area</a:t>
-            </a:r>
+              <a:t>is distributed to a wider </a:t>
+            </a:r>
+            <a:r>
+              <a:rPr lang="en-US" sz="3500" dirty="0" smtClean="0"/>
+              <a:t>area</a:t>
+            </a:r>
+            <a:r>
+              <a:rPr lang="tr-TR" sz="3500" dirty="0" smtClean="0"/>
+              <a:t>.</a:t>
+            </a:r>
+            <a:endParaRPr lang="en-US" sz="3500" dirty="0" smtClean="0"/>
           </a:p>
         </p:txBody>
       </p:sp>
@@ -2977,6 +2944,7 @@
           </a:bodyPr>
           <a:lstStyle/>
           <a:p>
+            <a:pPr algn="l"/>
             <a:r>
               <a:rPr lang="en-US" sz="4000" b="1" dirty="0" smtClean="0"/>
               <a:t>Applications</a:t>
@@ -2986,6 +2954,7 @@
             </a:endParaRPr>
           </a:p>
           <a:p>
+            <a:pPr algn="l"/>
             <a:r>
               <a:rPr lang="en-US" sz="3500" dirty="0" smtClean="0"/>
               <a:t>Electric traction</a:t>
@@ -3001,6 +2970,7 @@
             <a:endParaRPr lang="tr-TR" sz="3500" dirty="0" smtClean="0"/>
           </a:p>
           <a:p>
+            <a:pPr algn="l"/>
             <a:r>
               <a:rPr lang="en-US" sz="3500" dirty="0" smtClean="0"/>
               <a:t>Aerospace: aircrafts, space crafts</a:t>
@@ -3172,7 +3142,7 @@
           <p:nvPr/>
         </p:nvPicPr>
         <p:blipFill rotWithShape="1">
-          <a:blip r:embed="rId16">
+          <a:blip r:embed="rId15">
             <a:extLst>
               <a:ext uri="{28A0092B-C50C-407E-A947-70E740481C1C}">
                 <a14:useLocalDpi xmlns:a14="http://schemas.microsoft.com/office/drawing/2010/main" val="0"/>
@@ -3202,8 +3172,8 @@
         </p:nvSpPr>
         <p:spPr bwMode="auto">
           <a:xfrm>
-            <a:off x="15955199" y="10093816"/>
-            <a:ext cx="5111659" cy="2246769"/>
+            <a:off x="15955199" y="10346527"/>
+            <a:ext cx="5952301" cy="1708160"/>
           </a:xfrm>
           <a:prstGeom prst="rect">
             <a:avLst/>
@@ -3223,9 +3193,32 @@
           </a:bodyPr>
           <a:lstStyle/>
           <a:p>
+            <a:pPr algn="l"/>
             <a:r>
               <a:rPr lang="en-US" sz="3500" dirty="0" smtClean="0"/>
-              <a:t>DC link capacitors constitute 20% of </a:t>
+              <a:t>DC link capacitors </a:t>
+            </a:r>
+            <a:r>
+              <a:rPr lang="en-US" sz="3500" dirty="0" smtClean="0"/>
+              <a:t>constitute</a:t>
+            </a:r>
+            <a:r>
+              <a:rPr lang="tr-TR" sz="3500" dirty="0" smtClean="0"/>
+              <a:t>:</a:t>
+            </a:r>
+          </a:p>
+          <a:p>
+            <a:pPr marL="457200" indent="-457200" algn="l">
+              <a:buFont typeface="Arial" panose="020B0604020202020204" pitchFamily="34" charset="0"/>
+              <a:buChar char="•"/>
+            </a:pPr>
+            <a:r>
+              <a:rPr lang="en-US" sz="3500" dirty="0" smtClean="0"/>
+              <a:t>20</a:t>
+            </a:r>
+            <a:r>
+              <a:rPr lang="en-US" sz="3500" dirty="0" smtClean="0"/>
+              <a:t>% of </a:t>
             </a:r>
             <a:r>
               <a:rPr lang="en-US" sz="3500" b="1" dirty="0" smtClean="0"/>
@@ -3240,13 +3233,33 @@
               <a:t>weight</a:t>
             </a:r>
             <a:r>
+              <a:rPr lang="tr-TR" sz="3500" b="1" dirty="0" smtClean="0"/>
+              <a:t>,</a:t>
+            </a:r>
+            <a:endParaRPr lang="tr-TR" sz="3500" dirty="0"/>
+          </a:p>
+          <a:p>
+            <a:pPr marL="457200" indent="-457200" algn="l">
+              <a:buFont typeface="Arial" panose="020B0604020202020204" pitchFamily="34" charset="0"/>
+              <a:buChar char="•"/>
+            </a:pPr>
+            <a:r>
               <a:rPr lang="en-US" sz="3500" dirty="0" smtClean="0"/>
-              <a:t>, and 30% of </a:t>
+              <a:t>30% of </a:t>
             </a:r>
             <a:r>
               <a:rPr lang="en-US" sz="3500" b="1" dirty="0" smtClean="0"/>
-              <a:t>volume</a:t>
-            </a:r>
+              <a:t>volume </a:t>
+            </a:r>
+            <a:r>
+              <a:rPr lang="en-US" sz="3500" dirty="0" smtClean="0"/>
+              <a:t>[1]</a:t>
+            </a:r>
+            <a:r>
+              <a:rPr lang="en-US" sz="3500" b="1" dirty="0" smtClean="0"/>
+              <a:t>.</a:t>
+            </a:r>
+            <a:endParaRPr lang="en-US" sz="3500" b="1" dirty="0" smtClean="0"/>
           </a:p>
         </p:txBody>
       </p:sp>
@@ -3260,8 +3273,8 @@
         </p:nvSpPr>
         <p:spPr bwMode="auto">
           <a:xfrm>
-            <a:off x="15784496" y="13306138"/>
-            <a:ext cx="7203835" cy="4939814"/>
+            <a:off x="16140691" y="20438672"/>
+            <a:ext cx="6315534" cy="3862596"/>
           </a:xfrm>
           <a:prstGeom prst="rect">
             <a:avLst/>
@@ -3284,23 +3297,11 @@
             <a:pPr algn="l"/>
             <a:r>
               <a:rPr lang="en-US" sz="3500" dirty="0" smtClean="0"/>
-              <a:t>An </a:t>
-            </a:r>
-            <a:r>
-              <a:rPr lang="en-US" sz="3500" b="1" dirty="0" smtClean="0"/>
-              <a:t>analytical model </a:t>
+              <a:t>A </a:t>
             </a:r>
             <a:r>
               <a:rPr lang="en-US" sz="3500" dirty="0" smtClean="0"/>
-              <a:t>has been constructed. An </a:t>
-            </a:r>
-            <a:r>
-              <a:rPr lang="en-US" sz="3500" b="1" dirty="0" smtClean="0"/>
-              <a:t>algorithm</a:t>
-            </a:r>
-            <a:r>
-              <a:rPr lang="en-US" sz="3500" dirty="0" smtClean="0"/>
-              <a:t> has been developed. A set of </a:t>
+              <a:t>set of </a:t>
             </a:r>
             <a:r>
               <a:rPr lang="en-US" sz="3500" b="1" dirty="0" smtClean="0"/>
@@ -3363,8 +3364,8 @@
         </p:nvSpPr>
         <p:spPr bwMode="auto">
           <a:xfrm>
-            <a:off x="16155362" y="18402521"/>
-            <a:ext cx="6514138" cy="707886"/>
+            <a:off x="22669499" y="13331351"/>
+            <a:ext cx="6514138" cy="630942"/>
           </a:xfrm>
           <a:prstGeom prst="rect">
             <a:avLst/>
@@ -3385,10 +3386,10 @@
           <a:lstStyle/>
           <a:p>
             <a:r>
-              <a:rPr lang="en-US" sz="4000" b="1" dirty="0" smtClean="0"/>
+              <a:rPr lang="en-US" sz="3500" b="1" dirty="0" smtClean="0"/>
               <a:t>Effect of interleaving</a:t>
             </a:r>
-            <a:endParaRPr lang="en-US" sz="4000" dirty="0" smtClean="0">
+            <a:endParaRPr lang="en-US" sz="3500" dirty="0" smtClean="0">
               <a:latin typeface="+mj-lt"/>
             </a:endParaRPr>
           </a:p>
@@ -3404,8 +3405,8 @@
         </p:nvSpPr>
         <p:spPr bwMode="auto">
           <a:xfrm>
-            <a:off x="22742479" y="19849148"/>
-            <a:ext cx="6514138" cy="707886"/>
+            <a:off x="21488400" y="19261616"/>
+            <a:ext cx="8173329" cy="630942"/>
           </a:xfrm>
           <a:prstGeom prst="rect">
             <a:avLst/>
@@ -3426,10 +3427,10 @@
           <a:lstStyle/>
           <a:p>
             <a:r>
-              <a:rPr lang="en-US" sz="4000" b="1" dirty="0" smtClean="0"/>
-              <a:t>Phase-shift angle</a:t>
-            </a:r>
-            <a:endParaRPr lang="en-US" sz="4000" dirty="0" smtClean="0">
+              <a:rPr lang="en-US" sz="3500" b="1" dirty="0" smtClean="0"/>
+              <a:t>Optimum phase-shift angle selection</a:t>
+            </a:r>
+            <a:endParaRPr lang="en-US" sz="3500" dirty="0" smtClean="0">
               <a:latin typeface="+mj-lt"/>
             </a:endParaRPr>
           </a:p>
@@ -3444,14 +3445,14 @@
           <p:nvPr/>
         </p:nvPicPr>
         <p:blipFill>
-          <a:blip r:embed="rId17"/>
+          <a:blip r:embed="rId16"/>
           <a:stretch>
             <a:fillRect/>
           </a:stretch>
         </p:blipFill>
         <p:spPr>
           <a:xfrm>
-            <a:off x="15784496" y="29521674"/>
+            <a:off x="31492243" y="26458794"/>
             <a:ext cx="6885004" cy="2420878"/>
           </a:xfrm>
           <a:prstGeom prst="rect">
@@ -3469,7 +3470,7 @@
         </p:nvSpPr>
         <p:spPr bwMode="auto">
           <a:xfrm>
-            <a:off x="16474193" y="28388279"/>
+            <a:off x="32203101" y="25477946"/>
             <a:ext cx="6514138" cy="707886"/>
           </a:xfrm>
           <a:prstGeom prst="rect">
@@ -3510,7 +3511,7 @@
         </p:nvSpPr>
         <p:spPr bwMode="auto">
           <a:xfrm>
-            <a:off x="15955199" y="26385893"/>
+            <a:off x="15870848" y="25945335"/>
             <a:ext cx="13248450" cy="1708160"/>
           </a:xfrm>
           <a:prstGeom prst="rect">
@@ -3547,15 +3548,7 @@
             </a:pPr>
             <a:r>
               <a:rPr lang="en-US" sz="3500" dirty="0" smtClean="0"/>
-              <a:t>Fractional Slot Concentrated Winding (FSCW) </a:t>
-            </a:r>
-            <a:r>
-              <a:rPr lang="en-US" sz="3500" dirty="0" smtClean="0"/>
-              <a:t>s</a:t>
-            </a:r>
-            <a:r>
-              <a:rPr lang="en-US" sz="3500" dirty="0" smtClean="0"/>
-              <a:t>tator</a:t>
+              <a:t>Fractional Slot Concentrated Winding (FSCW) stator</a:t>
             </a:r>
           </a:p>
           <a:p>
@@ -3568,47 +3561,6 @@
               <a:t>Permanent Magnet Brushless DC (PM-BLDC) motor</a:t>
             </a:r>
             <a:endParaRPr lang="en-US" sz="3500" dirty="0" smtClean="0">
-              <a:latin typeface="+mj-lt"/>
-            </a:endParaRPr>
-          </a:p>
-        </p:txBody>
-      </p:sp>
-      <p:sp>
-        <p:nvSpPr>
-          <p:cNvPr id="67" name="Text Box 9"/>
-          <p:cNvSpPr txBox="1">
-            <a:spLocks noChangeArrowheads="1"/>
-          </p:cNvSpPr>
-          <p:nvPr/>
-        </p:nvSpPr>
-        <p:spPr bwMode="auto">
-          <a:xfrm>
-            <a:off x="22917232" y="28400595"/>
-            <a:ext cx="6514138" cy="707886"/>
-          </a:xfrm>
-          <a:prstGeom prst="rect">
-            <a:avLst/>
-          </a:prstGeom>
-          <a:noFill/>
-          <a:ln w="9525">
-            <a:noFill/>
-            <a:miter lim="800000"/>
-            <a:headEnd/>
-            <a:tailEnd/>
-          </a:ln>
-          <a:effectLst/>
-        </p:spPr>
-        <p:txBody>
-          <a:bodyPr wrap="square">
-            <a:spAutoFit/>
-          </a:bodyPr>
-          <a:lstStyle/>
-          <a:p>
-            <a:r>
-              <a:rPr lang="en-US" sz="4000" b="1" dirty="0" smtClean="0"/>
-              <a:t>Winding diagram</a:t>
-            </a:r>
-            <a:endParaRPr lang="en-US" sz="4000" dirty="0" smtClean="0">
               <a:latin typeface="+mj-lt"/>
             </a:endParaRPr>
           </a:p>
@@ -3624,7 +3576,7 @@
         </p:nvSpPr>
         <p:spPr bwMode="auto">
           <a:xfrm>
-            <a:off x="22742478" y="32642689"/>
+            <a:off x="22656014" y="27900001"/>
             <a:ext cx="6514138" cy="707886"/>
           </a:xfrm>
           <a:prstGeom prst="rect">
@@ -3650,8 +3602,8 @@
               <a:t>Loss </a:t>
             </a:r>
             <a:r>
-              <a:rPr lang="en-US" sz="4000" b="1" dirty="0" err="1" smtClean="0"/>
-              <a:t>Characterisation</a:t>
+              <a:rPr lang="en-US" sz="4000" b="1" dirty="0" smtClean="0"/>
+              <a:t>Characterization</a:t>
             </a:r>
             <a:endParaRPr lang="en-US" sz="4000" dirty="0" smtClean="0">
               <a:latin typeface="+mj-lt"/>
@@ -3659,30 +3611,6 @@
           </a:p>
         </p:txBody>
       </p:sp>
-      <p:pic>
-        <p:nvPicPr>
-          <p:cNvPr id="6" name="Picture 5"/>
-          <p:cNvPicPr>
-            <a:picLocks noChangeAspect="1"/>
-          </p:cNvPicPr>
-          <p:nvPr/>
-        </p:nvPicPr>
-        <p:blipFill>
-          <a:blip r:embed="rId18"/>
-          <a:stretch>
-            <a:fillRect/>
-          </a:stretch>
-        </p:blipFill>
-        <p:spPr>
-          <a:xfrm>
-            <a:off x="23327312" y="33350575"/>
-            <a:ext cx="5071587" cy="4838411"/>
-          </a:xfrm>
-          <a:prstGeom prst="rect">
-            <a:avLst/>
-          </a:prstGeom>
-        </p:spPr>
-      </p:pic>
       <p:sp>
         <p:nvSpPr>
           <p:cNvPr id="71" name="Text Box 9"/>
@@ -3693,8 +3621,8 @@
         </p:nvSpPr>
         <p:spPr bwMode="auto">
           <a:xfrm>
-            <a:off x="16146647" y="33609721"/>
-            <a:ext cx="6984999" cy="3323987"/>
+            <a:off x="16012504" y="28696205"/>
+            <a:ext cx="6207849" cy="3323987"/>
           </a:xfrm>
           <a:prstGeom prst="rect">
             <a:avLst/>
@@ -3714,22 +3642,73 @@
           </a:bodyPr>
           <a:lstStyle/>
           <a:p>
+            <a:pPr marL="457200" indent="-457200" algn="l">
+              <a:buFont typeface="Arial" panose="020B0604020202020204" pitchFamily="34" charset="0"/>
+              <a:buChar char="•"/>
+            </a:pPr>
+            <a:r>
+              <a:rPr lang="tr-TR" sz="3500" dirty="0">
+                <a:latin typeface="+mj-lt"/>
+              </a:rPr>
+              <a:t>F</a:t>
+            </a:r>
+            <a:r>
+              <a:rPr lang="tr-TR" sz="3500" dirty="0" smtClean="0">
+                <a:latin typeface="+mj-lt"/>
+              </a:rPr>
+              <a:t>our</a:t>
+            </a:r>
             <a:r>
               <a:rPr lang="en-US" sz="3500" dirty="0" smtClean="0">
                 <a:latin typeface="+mj-lt"/>
               </a:rPr>
-              <a:t>4 three-phase modules</a:t>
-            </a:r>
-          </a:p>
-          <a:p>
+              <a:t> </a:t>
+            </a:r>
             <a:r>
               <a:rPr lang="en-US" sz="3500" dirty="0" smtClean="0">
                 <a:latin typeface="+mj-lt"/>
               </a:rPr>
-              <a:t>24 slot double layer stator</a:t>
-            </a:r>
-          </a:p>
-          <a:p>
+              <a:t>three-phase modules</a:t>
+            </a:r>
+          </a:p>
+          <a:p>
+            <a:pPr marL="457200" indent="-457200" algn="l">
+              <a:buFont typeface="Arial" panose="020B0604020202020204" pitchFamily="34" charset="0"/>
+              <a:buChar char="•"/>
+            </a:pPr>
+            <a:r>
+              <a:rPr lang="en-US" sz="3500" dirty="0" smtClean="0">
+                <a:latin typeface="+mj-lt"/>
+              </a:rPr>
+              <a:t>7kW total output power</a:t>
+            </a:r>
+            <a:endParaRPr lang="en-US" sz="3500" dirty="0" smtClean="0">
+              <a:latin typeface="+mj-lt"/>
+            </a:endParaRPr>
+          </a:p>
+          <a:p>
+            <a:pPr marL="457200" indent="-457200" algn="l">
+              <a:buFont typeface="Arial" panose="020B0604020202020204" pitchFamily="34" charset="0"/>
+              <a:buChar char="•"/>
+            </a:pPr>
+            <a:r>
+              <a:rPr lang="en-US" sz="3500" dirty="0" smtClean="0">
+                <a:latin typeface="+mj-lt"/>
+              </a:rPr>
+              <a:t>24 </a:t>
+            </a:r>
+            <a:r>
+              <a:rPr lang="en-US" sz="3500" dirty="0" smtClean="0">
+                <a:latin typeface="+mj-lt"/>
+              </a:rPr>
+              <a:t>slot double layer stator</a:t>
+            </a:r>
+          </a:p>
+          <a:p>
+            <a:pPr marL="457200" indent="-457200" algn="l">
+              <a:buFont typeface="Arial" panose="020B0604020202020204" pitchFamily="34" charset="0"/>
+              <a:buChar char="•"/>
+            </a:pPr>
             <a:r>
               <a:rPr lang="en-US" sz="3500" dirty="0" smtClean="0">
                 <a:latin typeface="+mj-lt"/>
@@ -3738,6 +3717,10 @@
             </a:r>
           </a:p>
           <a:p>
+            <a:pPr marL="457200" indent="-457200" algn="l">
+              <a:buFont typeface="Arial" panose="020B0604020202020204" pitchFamily="34" charset="0"/>
+              <a:buChar char="•"/>
+            </a:pPr>
             <a:r>
               <a:rPr lang="en-US" sz="3500" dirty="0" smtClean="0">
                 <a:latin typeface="+mj-lt"/>
@@ -3746,17 +3729,33 @@
             </a:r>
           </a:p>
           <a:p>
+            <a:pPr marL="457200" indent="-457200" algn="l">
+              <a:buFont typeface="Arial" panose="020B0604020202020204" pitchFamily="34" charset="0"/>
+              <a:buChar char="•"/>
+            </a:pPr>
+            <a:r>
+              <a:rPr lang="tr-TR" sz="3500" dirty="0" smtClean="0">
+                <a:latin typeface="+mj-lt"/>
+              </a:rPr>
+              <a:t>Four</a:t>
+            </a:r>
             <a:r>
               <a:rPr lang="en-US" sz="3500" dirty="0" smtClean="0">
                 <a:latin typeface="+mj-lt"/>
               </a:rPr>
-              <a:t>4 20uF, 450V capacitors</a:t>
+              <a:t> </a:t>
             </a:r>
             <a:r>
               <a:rPr lang="en-US" sz="3500" dirty="0" smtClean="0">
                 <a:latin typeface="+mj-lt"/>
               </a:rPr>
-              <a:t>, connected in parallel</a:t>
+              <a:t>20uF, 450V </a:t>
+            </a:r>
+            <a:r>
+              <a:rPr lang="en-US" sz="3500" dirty="0" smtClean="0">
+                <a:latin typeface="+mj-lt"/>
+              </a:rPr>
+              <a:t>capacitors</a:t>
             </a:r>
             <a:endParaRPr lang="en-US" sz="3500" dirty="0" smtClean="0">
               <a:latin typeface="+mj-lt"/>
@@ -3774,7 +3773,7 @@
         </p:nvSpPr>
         <p:spPr bwMode="auto">
           <a:xfrm>
-            <a:off x="16351790" y="32686608"/>
+            <a:off x="15860694" y="27866590"/>
             <a:ext cx="6514138" cy="707886"/>
           </a:xfrm>
           <a:prstGeom prst="rect">
@@ -3805,6 +3804,317 @@
           </a:p>
         </p:txBody>
       </p:sp>
+      <p:sp>
+        <p:nvSpPr>
+          <p:cNvPr id="46" name="Text Box 9"/>
+          <p:cNvSpPr txBox="1">
+            <a:spLocks noChangeArrowheads="1"/>
+          </p:cNvSpPr>
+          <p:nvPr/>
+        </p:nvSpPr>
+        <p:spPr bwMode="auto">
+          <a:xfrm>
+            <a:off x="15513315" y="12579892"/>
+            <a:ext cx="6861517" cy="1169551"/>
+          </a:xfrm>
+          <a:prstGeom prst="rect">
+            <a:avLst/>
+          </a:prstGeom>
+          <a:noFill/>
+          <a:ln w="9525">
+            <a:noFill/>
+            <a:miter lim="800000"/>
+            <a:headEnd/>
+            <a:tailEnd/>
+          </a:ln>
+          <a:effectLst/>
+        </p:spPr>
+        <p:txBody>
+          <a:bodyPr wrap="square">
+            <a:spAutoFit/>
+          </a:bodyPr>
+          <a:lstStyle/>
+          <a:p>
+            <a:r>
+              <a:rPr lang="en-US" sz="3500" b="1" dirty="0" smtClean="0"/>
+              <a:t>DC link capacitor selection algorithm</a:t>
+            </a:r>
+            <a:endParaRPr lang="en-US" sz="3500" b="1" dirty="0" smtClean="0">
+              <a:latin typeface="+mj-lt"/>
+            </a:endParaRPr>
+          </a:p>
+        </p:txBody>
+      </p:sp>
+      <p:sp>
+        <p:nvSpPr>
+          <p:cNvPr id="51" name="Text Box 42"/>
+          <p:cNvSpPr txBox="1">
+            <a:spLocks noChangeArrowheads="1"/>
+          </p:cNvSpPr>
+          <p:nvPr/>
+        </p:nvSpPr>
+        <p:spPr bwMode="auto">
+          <a:xfrm>
+            <a:off x="16145239" y="35591562"/>
+            <a:ext cx="13115925" cy="1015663"/>
+          </a:xfrm>
+          <a:prstGeom prst="rect">
+            <a:avLst/>
+          </a:prstGeom>
+          <a:noFill/>
+          <a:ln w="9525">
+            <a:noFill/>
+            <a:miter lim="800000"/>
+            <a:headEnd/>
+            <a:tailEnd/>
+          </a:ln>
+          <a:effectLst/>
+        </p:spPr>
+        <p:txBody>
+          <a:bodyPr wrap="square">
+            <a:spAutoFit/>
+          </a:bodyPr>
+          <a:lstStyle/>
+          <a:p>
+            <a:pPr algn="l" defTabSz="4389438">
+              <a:spcBef>
+                <a:spcPct val="50000"/>
+              </a:spcBef>
+            </a:pPr>
+            <a:r>
+              <a:rPr lang="en-US" sz="6000" b="1" dirty="0" smtClean="0">
+                <a:solidFill>
+                  <a:srgbClr val="003399"/>
+                </a:solidFill>
+              </a:rPr>
+              <a:t>Conclusions &amp; Planned Work</a:t>
+            </a:r>
+            <a:endParaRPr lang="en-US" sz="6000" b="1" dirty="0">
+              <a:solidFill>
+                <a:srgbClr val="003399"/>
+              </a:solidFill>
+            </a:endParaRPr>
+          </a:p>
+        </p:txBody>
+      </p:sp>
+      <p:sp>
+        <p:nvSpPr>
+          <p:cNvPr id="57" name="Text Box 9"/>
+          <p:cNvSpPr txBox="1">
+            <a:spLocks noChangeArrowheads="1"/>
+          </p:cNvSpPr>
+          <p:nvPr/>
+        </p:nvSpPr>
+        <p:spPr bwMode="auto">
+          <a:xfrm>
+            <a:off x="16140691" y="33155049"/>
+            <a:ext cx="6207849" cy="1708160"/>
+          </a:xfrm>
+          <a:prstGeom prst="rect">
+            <a:avLst/>
+          </a:prstGeom>
+          <a:noFill/>
+          <a:ln w="9525">
+            <a:noFill/>
+            <a:miter lim="800000"/>
+            <a:headEnd/>
+            <a:tailEnd/>
+          </a:ln>
+          <a:effectLst/>
+        </p:spPr>
+        <p:txBody>
+          <a:bodyPr wrap="square">
+            <a:spAutoFit/>
+          </a:bodyPr>
+          <a:lstStyle/>
+          <a:p>
+            <a:pPr marL="457200" indent="-457200" algn="l">
+              <a:buFont typeface="Wingdings" panose="05000000000000000000" pitchFamily="2" charset="2"/>
+              <a:buChar char="q"/>
+            </a:pPr>
+            <a:r>
+              <a:rPr lang="en-US" sz="3500" dirty="0" smtClean="0">
+                <a:latin typeface="+mj-lt"/>
+              </a:rPr>
+              <a:t>Drive efficiency</a:t>
+            </a:r>
+            <a:r>
+              <a:rPr lang="en-US" sz="3500" b="1" dirty="0" smtClean="0">
+                <a:latin typeface="+mj-lt"/>
+              </a:rPr>
+              <a:t>: 99%</a:t>
+            </a:r>
+            <a:endParaRPr lang="en-US" sz="3500" b="1" dirty="0" smtClean="0">
+              <a:latin typeface="+mj-lt"/>
+            </a:endParaRPr>
+          </a:p>
+          <a:p>
+            <a:pPr marL="457200" indent="-457200" algn="l">
+              <a:buFont typeface="Wingdings" panose="05000000000000000000" pitchFamily="2" charset="2"/>
+              <a:buChar char="q"/>
+            </a:pPr>
+            <a:r>
+              <a:rPr lang="en-US" sz="3500" dirty="0" smtClean="0">
+                <a:latin typeface="+mj-lt"/>
+              </a:rPr>
+              <a:t>Power density</a:t>
+            </a:r>
+            <a:r>
+              <a:rPr lang="en-US" sz="3500" b="1" dirty="0" smtClean="0">
+                <a:latin typeface="+mj-lt"/>
+              </a:rPr>
+              <a:t>: 40 W/cm</a:t>
+            </a:r>
+            <a:r>
+              <a:rPr lang="en-US" sz="3500" b="1" baseline="30000" dirty="0" smtClean="0">
+                <a:latin typeface="+mj-lt"/>
+              </a:rPr>
+              <a:t>3</a:t>
+            </a:r>
+          </a:p>
+          <a:p>
+            <a:pPr marL="457200" indent="-457200" algn="l">
+              <a:buFont typeface="Wingdings" panose="05000000000000000000" pitchFamily="2" charset="2"/>
+              <a:buChar char="q"/>
+            </a:pPr>
+            <a:r>
+              <a:rPr lang="en-US" sz="3500" dirty="0" smtClean="0">
+                <a:solidFill>
+                  <a:srgbClr val="FF0000"/>
+                </a:solidFill>
+                <a:latin typeface="+mj-lt"/>
+              </a:rPr>
+              <a:t>What else ???</a:t>
+            </a:r>
+            <a:endParaRPr lang="en-US" sz="3500" dirty="0" smtClean="0">
+              <a:solidFill>
+                <a:srgbClr val="FF0000"/>
+              </a:solidFill>
+              <a:latin typeface="+mj-lt"/>
+            </a:endParaRPr>
+          </a:p>
+        </p:txBody>
+      </p:sp>
+      <p:sp>
+        <p:nvSpPr>
+          <p:cNvPr id="60" name="Text Box 9"/>
+          <p:cNvSpPr txBox="1">
+            <a:spLocks noChangeArrowheads="1"/>
+          </p:cNvSpPr>
+          <p:nvPr/>
+        </p:nvSpPr>
+        <p:spPr bwMode="auto">
+          <a:xfrm>
+            <a:off x="15999023" y="32240528"/>
+            <a:ext cx="6514138" cy="707886"/>
+          </a:xfrm>
+          <a:prstGeom prst="rect">
+            <a:avLst/>
+          </a:prstGeom>
+          <a:noFill/>
+          <a:ln w="9525">
+            <a:noFill/>
+            <a:miter lim="800000"/>
+            <a:headEnd/>
+            <a:tailEnd/>
+          </a:ln>
+          <a:effectLst/>
+        </p:spPr>
+        <p:txBody>
+          <a:bodyPr wrap="square">
+            <a:spAutoFit/>
+          </a:bodyPr>
+          <a:lstStyle/>
+          <a:p>
+            <a:r>
+              <a:rPr lang="en-US" sz="4000" b="1" dirty="0" smtClean="0"/>
+              <a:t>Results</a:t>
+            </a:r>
+            <a:endParaRPr lang="en-US" sz="4000" dirty="0" smtClean="0">
+              <a:latin typeface="+mj-lt"/>
+            </a:endParaRPr>
+          </a:p>
+        </p:txBody>
+      </p:sp>
+      <p:sp>
+        <p:nvSpPr>
+          <p:cNvPr id="61" name="Text Box 9"/>
+          <p:cNvSpPr txBox="1">
+            <a:spLocks noChangeArrowheads="1"/>
+          </p:cNvSpPr>
+          <p:nvPr/>
+        </p:nvSpPr>
+        <p:spPr bwMode="auto">
+          <a:xfrm>
+            <a:off x="16140691" y="36854017"/>
+            <a:ext cx="13232902" cy="630942"/>
+          </a:xfrm>
+          <a:prstGeom prst="rect">
+            <a:avLst/>
+          </a:prstGeom>
+          <a:noFill/>
+          <a:ln w="9525">
+            <a:noFill/>
+            <a:miter lim="800000"/>
+            <a:headEnd/>
+            <a:tailEnd/>
+          </a:ln>
+          <a:effectLst/>
+        </p:spPr>
+        <p:txBody>
+          <a:bodyPr wrap="square">
+            <a:spAutoFit/>
+          </a:bodyPr>
+          <a:lstStyle/>
+          <a:p>
+            <a:pPr algn="l"/>
+            <a:r>
+              <a:rPr lang="en-US" sz="3500" dirty="0" smtClean="0">
+                <a:solidFill>
+                  <a:srgbClr val="FF0000"/>
+                </a:solidFill>
+                <a:latin typeface="+mj-lt"/>
+              </a:rPr>
+              <a:t>A laboratory prototype is being developed</a:t>
+            </a:r>
+            <a:endParaRPr lang="en-US" sz="3500" dirty="0" smtClean="0">
+              <a:solidFill>
+                <a:srgbClr val="FF0000"/>
+              </a:solidFill>
+              <a:latin typeface="+mj-lt"/>
+            </a:endParaRPr>
+          </a:p>
+        </p:txBody>
+      </p:sp>
+      <p:pic>
+        <p:nvPicPr>
+          <p:cNvPr id="10" name="Picture 9"/>
+          <p:cNvPicPr>
+            <a:picLocks noChangeAspect="1"/>
+          </p:cNvPicPr>
+          <p:nvPr/>
+        </p:nvPicPr>
+        <p:blipFill rotWithShape="1">
+          <a:blip r:embed="rId17">
+            <a:extLst>
+              <a:ext uri="{28A0092B-C50C-407E-A947-70E740481C1C}">
+                <a14:useLocalDpi xmlns:a14="http://schemas.microsoft.com/office/drawing/2010/main" val="0"/>
+              </a:ext>
+            </a:extLst>
+          </a:blip>
+          <a:srcRect l="6064" t="6193" r="4585" b="6103"/>
+          <a:stretch/>
+        </p:blipFill>
+        <p:spPr>
+          <a:xfrm>
+            <a:off x="22651075" y="28626311"/>
+            <a:ext cx="6153150" cy="5638800"/>
+          </a:xfrm>
+          <a:prstGeom prst="rect">
+            <a:avLst/>
+          </a:prstGeom>
+        </p:spPr>
+      </p:pic>
     </p:spTree>
   </p:cSld>
   <p:clrMapOvr>

</xml_diff>